<commit_message>
Slides for section 3
</commit_message>
<xml_diff>
--- a/2. Recognising Faces/Slides/2.4.pptx
+++ b/2. Recognising Faces/Slides/2.4.pptx
@@ -31,7 +31,7 @@
       <p:boldItalic r:id="rId14"/>
     </p:embeddedFont>
     <p:embeddedFont>
-      <p:font typeface="Roboto"/>
+      <p:font typeface="Roboto" panose="02000000000000000000" pitchFamily="2" charset="0"/>
       <p:regular r:id="rId15"/>
       <p:bold r:id="rId16"/>
       <p:italic r:id="rId17"/>
@@ -3520,8 +3520,13 @@
           <a:p>
             <a:r>
               <a:rPr lang="en" dirty="0"/>
-              <a:t>Using Speech</a:t>
+              <a:t>Predicting Taxi </a:t>
             </a:r>
+            <a:r>
+              <a:rPr lang="en"/>
+              <a:t>Journey Times</a:t>
+            </a:r>
+            <a:endParaRPr lang="en" dirty="0"/>
           </a:p>
         </p:txBody>
       </p:sp>

</xml_diff>